<commit_message>
updated (working! to a first order at least) code. I also extended it so you can have more than one exogenous variable (ie different capital and labor productivity shocks, with some correlation), but I haven't done much to address the curse of dimensionality so running the model with four states is pretty rough.
</commit_message>
<xml_diff>
--- a/mf_code/overview.pptx
+++ b/mf_code/overview.pptx
@@ -244,7 +244,7 @@
           <a:p>
             <a:fld id="{B904C2B5-C1D1-D247-8AFF-0BFAF821E07D}" type="datetimeFigureOut">
               <a:rPr lang="en-US" smtClean="0"/>
-              <a:t>6/7/21</a:t>
+              <a:t>8/5/21</a:t>
             </a:fld>
             <a:endParaRPr lang="en-US"/>
           </a:p>
@@ -414,7 +414,7 @@
           <a:p>
             <a:fld id="{B904C2B5-C1D1-D247-8AFF-0BFAF821E07D}" type="datetimeFigureOut">
               <a:rPr lang="en-US" smtClean="0"/>
-              <a:t>6/7/21</a:t>
+              <a:t>8/5/21</a:t>
             </a:fld>
             <a:endParaRPr lang="en-US"/>
           </a:p>
@@ -594,7 +594,7 @@
           <a:p>
             <a:fld id="{B904C2B5-C1D1-D247-8AFF-0BFAF821E07D}" type="datetimeFigureOut">
               <a:rPr lang="en-US" smtClean="0"/>
-              <a:t>6/7/21</a:t>
+              <a:t>8/5/21</a:t>
             </a:fld>
             <a:endParaRPr lang="en-US"/>
           </a:p>
@@ -764,7 +764,7 @@
           <a:p>
             <a:fld id="{B904C2B5-C1D1-D247-8AFF-0BFAF821E07D}" type="datetimeFigureOut">
               <a:rPr lang="en-US" smtClean="0"/>
-              <a:t>6/7/21</a:t>
+              <a:t>8/5/21</a:t>
             </a:fld>
             <a:endParaRPr lang="en-US"/>
           </a:p>
@@ -1008,7 +1008,7 @@
           <a:p>
             <a:fld id="{B904C2B5-C1D1-D247-8AFF-0BFAF821E07D}" type="datetimeFigureOut">
               <a:rPr lang="en-US" smtClean="0"/>
-              <a:t>6/7/21</a:t>
+              <a:t>8/5/21</a:t>
             </a:fld>
             <a:endParaRPr lang="en-US"/>
           </a:p>
@@ -1240,7 +1240,7 @@
           <a:p>
             <a:fld id="{B904C2B5-C1D1-D247-8AFF-0BFAF821E07D}" type="datetimeFigureOut">
               <a:rPr lang="en-US" smtClean="0"/>
-              <a:t>6/7/21</a:t>
+              <a:t>8/5/21</a:t>
             </a:fld>
             <a:endParaRPr lang="en-US"/>
           </a:p>
@@ -1607,7 +1607,7 @@
           <a:p>
             <a:fld id="{B904C2B5-C1D1-D247-8AFF-0BFAF821E07D}" type="datetimeFigureOut">
               <a:rPr lang="en-US" smtClean="0"/>
-              <a:t>6/7/21</a:t>
+              <a:t>8/5/21</a:t>
             </a:fld>
             <a:endParaRPr lang="en-US"/>
           </a:p>
@@ -1725,7 +1725,7 @@
           <a:p>
             <a:fld id="{B904C2B5-C1D1-D247-8AFF-0BFAF821E07D}" type="datetimeFigureOut">
               <a:rPr lang="en-US" smtClean="0"/>
-              <a:t>6/7/21</a:t>
+              <a:t>8/5/21</a:t>
             </a:fld>
             <a:endParaRPr lang="en-US"/>
           </a:p>
@@ -1820,7 +1820,7 @@
           <a:p>
             <a:fld id="{B904C2B5-C1D1-D247-8AFF-0BFAF821E07D}" type="datetimeFigureOut">
               <a:rPr lang="en-US" smtClean="0"/>
-              <a:t>6/7/21</a:t>
+              <a:t>8/5/21</a:t>
             </a:fld>
             <a:endParaRPr lang="en-US"/>
           </a:p>
@@ -2097,7 +2097,7 @@
           <a:p>
             <a:fld id="{B904C2B5-C1D1-D247-8AFF-0BFAF821E07D}" type="datetimeFigureOut">
               <a:rPr lang="en-US" smtClean="0"/>
-              <a:t>6/7/21</a:t>
+              <a:t>8/5/21</a:t>
             </a:fld>
             <a:endParaRPr lang="en-US"/>
           </a:p>
@@ -2354,7 +2354,7 @@
           <a:p>
             <a:fld id="{B904C2B5-C1D1-D247-8AFF-0BFAF821E07D}" type="datetimeFigureOut">
               <a:rPr lang="en-US" smtClean="0"/>
-              <a:t>6/7/21</a:t>
+              <a:t>8/5/21</a:t>
             </a:fld>
             <a:endParaRPr lang="en-US"/>
           </a:p>
@@ -2567,7 +2567,7 @@
           <a:p>
             <a:fld id="{B904C2B5-C1D1-D247-8AFF-0BFAF821E07D}" type="datetimeFigureOut">
               <a:rPr lang="en-US" smtClean="0"/>
-              <a:t>6/7/21</a:t>
+              <a:t>8/5/21</a:t>
             </a:fld>
             <a:endParaRPr lang="en-US"/>
           </a:p>
@@ -3082,13 +3082,13 @@
         </p:nvSpPr>
         <p:spPr>
           <a:xfrm>
-            <a:off x="354330" y="0"/>
-            <a:ext cx="2811780" cy="4309109"/>
+            <a:off x="91440" y="0"/>
+            <a:ext cx="2811780" cy="4103370"/>
           </a:xfrm>
         </p:spPr>
         <p:txBody>
           <a:bodyPr>
-            <a:normAutofit fontScale="55000" lnSpcReduction="20000"/>
+            <a:normAutofit fontScale="47500" lnSpcReduction="20000"/>
           </a:bodyPr>
           <a:lstStyle/>
           <a:p>
@@ -3147,6 +3147,13 @@
             </a:r>
           </a:p>
           <a:p>
+            <a:pPr lvl="2"/>
+            <a:r>
+              <a:rPr lang="en-US" dirty="0"/>
+              <a:t>other (controls that aren’t endogenous states) </a:t>
+            </a:r>
+          </a:p>
+          <a:p>
             <a:pPr lvl="1"/>
             <a:r>
               <a:rPr lang="en-US" dirty="0"/>
@@ -3157,14 +3164,14 @@
             <a:pPr lvl="2"/>
             <a:r>
               <a:rPr lang="en-US" dirty="0"/>
-              <a:t>min </a:t>
-            </a:r>
-          </a:p>
-          <a:p>
-            <a:pPr lvl="2"/>
-            <a:r>
-              <a:rPr lang="en-US" dirty="0"/>
-              <a:t>max </a:t>
+              <a:t>min -.states</a:t>
+            </a:r>
+          </a:p>
+          <a:p>
+            <a:pPr lvl="2"/>
+            <a:r>
+              <a:rPr lang="en-US" dirty="0"/>
+              <a:t>max  -.states</a:t>
             </a:r>
           </a:p>
           <a:p>
@@ -3184,17 +3191,6 @@
           <a:p>
             <a:pPr lvl="2"/>
             <a:r>
-              <a:rPr lang="en-US" dirty="0" err="1"/>
-              <a:t>objective_foc</a:t>
-            </a:r>
-            <a:r>
-              <a:rPr lang="en-US" dirty="0"/>
-              <a:t> </a:t>
-            </a:r>
-          </a:p>
-          <a:p>
-            <a:pPr lvl="2"/>
-            <a:r>
               <a:rPr lang="en-US" dirty="0"/>
               <a:t>… model specific </a:t>
             </a:r>
@@ -3203,40 +3199,49 @@
             <a:pPr lvl="1"/>
             <a:r>
               <a:rPr lang="en-US" dirty="0"/>
+              <a:t>utilities </a:t>
+            </a:r>
+          </a:p>
+          <a:p>
+            <a:pPr lvl="2"/>
+            <a:r>
+              <a:rPr lang="en-US" dirty="0"/>
+              <a:t>min -.states</a:t>
+            </a:r>
+          </a:p>
+          <a:p>
+            <a:pPr lvl="2"/>
+            <a:r>
+              <a:rPr lang="en-US" dirty="0"/>
+              <a:t>max -.states</a:t>
+            </a:r>
+          </a:p>
+          <a:p>
+            <a:pPr lvl="1"/>
+            <a:r>
+              <a:rPr lang="en-US" dirty="0"/>
               <a:t>conditions </a:t>
             </a:r>
           </a:p>
           <a:p>
             <a:pPr lvl="2"/>
             <a:r>
-              <a:rPr lang="en-US" dirty="0" err="1"/>
-              <a:t>euler</a:t>
-            </a:r>
-            <a:r>
-              <a:rPr lang="en-US" dirty="0"/>
-              <a:t> equations, bellman equations.. .</a:t>
-            </a:r>
-            <a:r>
-              <a:rPr lang="en-US" dirty="0" err="1"/>
-              <a:t>etc</a:t>
-            </a:r>
-            <a:r>
-              <a:rPr lang="en-US" dirty="0"/>
-              <a:t> </a:t>
+              <a:rPr lang="en-US" dirty="0"/>
+              <a:t>b1 (for VFI) </a:t>
             </a:r>
           </a:p>
           <a:p>
             <a:pPr lvl="1"/>
             <a:r>
               <a:rPr lang="en-US" dirty="0"/>
-              <a:t>clearing</a:t>
+              <a:t>clearing -.prices </a:t>
             </a:r>
           </a:p>
           <a:p>
             <a:pPr lvl="1"/>
             <a:r>
               <a:rPr lang="en-US" dirty="0"/>
-              <a:t>other</a:t>
+              <a:t>other -.other </a:t>
             </a:r>
           </a:p>
           <a:p>
@@ -3260,8 +3265,8 @@
         </p:nvSpPr>
         <p:spPr>
           <a:xfrm>
-            <a:off x="2920637" y="11681"/>
-            <a:ext cx="3548744" cy="6457700"/>
+            <a:off x="2772047" y="11681"/>
+            <a:ext cx="3548744" cy="7040629"/>
           </a:xfrm>
           <a:prstGeom prst="rect">
             <a:avLst/>
@@ -3269,7 +3274,7 @@
         </p:spPr>
         <p:txBody>
           <a:bodyPr vert="horz" lIns="91440" tIns="45720" rIns="91440" bIns="45720" rtlCol="0">
-            <a:normAutofit fontScale="55000" lnSpcReduction="20000"/>
+            <a:normAutofit fontScale="47500" lnSpcReduction="20000"/>
           </a:bodyPr>
           <a:lstStyle>
             <a:lvl1pPr marL="228600" indent="-228600" algn="l" defTabSz="914400" rtl="0" eaLnBrk="1" latinLnBrk="0" hangingPunct="1">
@@ -3502,6 +3507,36 @@
             </a:r>
           </a:p>
           <a:p>
+            <a:pPr lvl="2"/>
+            <a:r>
+              <a:rPr lang="en-US" dirty="0"/>
+              <a:t>print</a:t>
+            </a:r>
+          </a:p>
+          <a:p>
+            <a:pPr lvl="2"/>
+            <a:r>
+              <a:rPr lang="en-US" dirty="0"/>
+              <a:t>reset</a:t>
+            </a:r>
+          </a:p>
+          <a:p>
+            <a:pPr lvl="2"/>
+            <a:r>
+              <a:rPr lang="en-US" dirty="0" err="1"/>
+              <a:t>enforce_grid_max</a:t>
+            </a:r>
+            <a:endParaRPr lang="en-US" dirty="0"/>
+          </a:p>
+          <a:p>
+            <a:pPr lvl="2"/>
+            <a:r>
+              <a:rPr lang="en-US" dirty="0" err="1"/>
+              <a:t>vtrick</a:t>
+            </a:r>
+            <a:endParaRPr lang="en-US" dirty="0"/>
+          </a:p>
+          <a:p>
             <a:pPr lvl="1"/>
             <a:r>
               <a:rPr lang="en-US" dirty="0"/>
@@ -3512,15 +3547,25 @@
             <a:pPr lvl="2"/>
             <a:r>
               <a:rPr lang="en-US" dirty="0"/>
-              <a:t>algorithm </a:t>
-            </a:r>
-          </a:p>
-          <a:p>
-            <a:pPr lvl="2"/>
-            <a:r>
-              <a:rPr lang="en-US" dirty="0"/>
-              <a:t>basis</a:t>
-            </a:r>
+              <a:t>toolkit basis .</a:t>
+            </a:r>
+            <a:r>
+              <a:rPr lang="en-US" dirty="0" err="1"/>
+              <a:t>functiontype</a:t>
+            </a:r>
+            <a:endParaRPr lang="en-US" dirty="0"/>
+          </a:p>
+          <a:p>
+            <a:pPr lvl="2"/>
+            <a:r>
+              <a:rPr lang="en-US" dirty="0"/>
+              <a:t>basis .</a:t>
+            </a:r>
+            <a:r>
+              <a:rPr lang="en-US" dirty="0" err="1"/>
+              <a:t>functiontype</a:t>
+            </a:r>
+            <a:endParaRPr lang="en-US" dirty="0"/>
           </a:p>
           <a:p>
             <a:pPr lvl="2"/>
@@ -3528,6 +3573,14 @@
               <a:rPr lang="en-US" dirty="0" err="1"/>
               <a:t>extrapolation_method</a:t>
             </a:r>
+            <a:r>
+              <a:rPr lang="en-US" dirty="0"/>
+              <a:t> .</a:t>
+            </a:r>
+            <a:r>
+              <a:rPr lang="en-US" dirty="0" err="1"/>
+              <a:t>functiontype</a:t>
+            </a:r>
             <a:endParaRPr lang="en-US" dirty="0"/>
           </a:p>
           <a:p>
@@ -3541,7 +3594,7 @@
             <a:pPr lvl="2"/>
             <a:r>
               <a:rPr lang="en-US" dirty="0"/>
-              <a:t>breakpoints</a:t>
+              <a:t>Breakpoints – not used </a:t>
             </a:r>
           </a:p>
           <a:p>
@@ -3576,22 +3629,28 @@
             <a:pPr lvl="1"/>
             <a:r>
               <a:rPr lang="en-US" dirty="0"/>
-              <a:t>find </a:t>
+              <a:t>maximize </a:t>
+            </a:r>
+          </a:p>
+          <a:p>
+            <a:pPr lvl="2"/>
+            <a:r>
+              <a:rPr lang="en-US" dirty="0"/>
+              <a:t>algorithm</a:t>
+            </a:r>
+          </a:p>
+          <a:p>
+            <a:pPr lvl="2"/>
+            <a:r>
+              <a:rPr lang="en-US" dirty="0"/>
+              <a:t>threshold</a:t>
             </a:r>
           </a:p>
           <a:p>
             <a:pPr lvl="2"/>
             <a:r>
               <a:rPr lang="en-US" dirty="0" err="1"/>
-              <a:t>hill_climb</a:t>
-            </a:r>
-            <a:endParaRPr lang="en-US" dirty="0"/>
-          </a:p>
-          <a:p>
-            <a:pPr lvl="2"/>
-            <a:r>
-              <a:rPr lang="en-US" dirty="0" err="1"/>
-              <a:t>root_find</a:t>
+              <a:t>checkendpoint</a:t>
             </a:r>
             <a:endParaRPr lang="en-US" dirty="0"/>
           </a:p>
@@ -3632,7 +3691,14 @@
             <a:pPr lvl="2"/>
             <a:r>
               <a:rPr lang="en-US" dirty="0"/>
-              <a:t>thresholds </a:t>
+              <a:t>threshold</a:t>
+            </a:r>
+          </a:p>
+          <a:p>
+            <a:pPr lvl="2"/>
+            <a:r>
+              <a:rPr lang="en-US" dirty="0"/>
+              <a:t>print</a:t>
             </a:r>
           </a:p>
           <a:p>
@@ -3657,6 +3723,14 @@
             <a:pPr lvl="2"/>
             <a:r>
               <a:rPr lang="en-US" dirty="0" err="1"/>
+              <a:t>check_interval</a:t>
+            </a:r>
+            <a:endParaRPr lang="en-US" dirty="0"/>
+          </a:p>
+          <a:p>
+            <a:pPr lvl="2"/>
+            <a:r>
+              <a:rPr lang="en-US" dirty="0" err="1"/>
               <a:t>brent_threshold</a:t>
             </a:r>
             <a:endParaRPr lang="en-US" dirty="0"/>
@@ -3672,7 +3746,7 @@
             <a:pPr lvl="2"/>
             <a:r>
               <a:rPr lang="en-US" dirty="0"/>
-              <a:t>thresholds</a:t>
+              <a:t>threshold</a:t>
             </a:r>
           </a:p>
         </p:txBody>
@@ -3693,8 +3767,8 @@
         </p:nvSpPr>
         <p:spPr>
           <a:xfrm>
-            <a:off x="5629547" y="250"/>
-            <a:ext cx="2897233" cy="6858001"/>
+            <a:off x="5629547" y="251"/>
+            <a:ext cx="2897233" cy="6080509"/>
           </a:xfrm>
           <a:prstGeom prst="rect">
             <a:avLst/>
@@ -3702,7 +3776,7 @@
         </p:spPr>
         <p:txBody>
           <a:bodyPr vert="horz" lIns="91440" tIns="45720" rIns="91440" bIns="45720" rtlCol="0">
-            <a:normAutofit fontScale="55000" lnSpcReduction="20000"/>
+            <a:normAutofit fontScale="47500" lnSpcReduction="20000"/>
           </a:bodyPr>
           <a:lstStyle>
             <a:lvl1pPr marL="228600" indent="-228600" algn="l" defTabSz="914400" rtl="0" eaLnBrk="1" latinLnBrk="0" hangingPunct="1">
@@ -3919,17 +3993,6 @@
           <a:p>
             <a:pPr lvl="2"/>
             <a:r>
-              <a:rPr lang="en-US" dirty="0" err="1"/>
-              <a:t>ndgrid</a:t>
-            </a:r>
-            <a:r>
-              <a:rPr lang="en-US" dirty="0"/>
-              <a:t> -- .states</a:t>
-            </a:r>
-          </a:p>
-          <a:p>
-            <a:pPr lvl="2"/>
-            <a:r>
               <a:rPr lang="en-US" dirty="0"/>
               <a:t>cell</a:t>
             </a:r>
@@ -3937,16 +4000,29 @@
           <a:p>
             <a:pPr lvl="2"/>
             <a:r>
-              <a:rPr lang="en-US" dirty="0" err="1"/>
-              <a:t>cell_prime</a:t>
-            </a:r>
-            <a:endParaRPr lang="en-US" dirty="0"/>
-          </a:p>
-          <a:p>
-            <a:pPr lvl="2"/>
-            <a:r>
-              <a:rPr lang="en-US" dirty="0"/>
-              <a:t>stack</a:t>
+              <a:rPr lang="en-US" dirty="0"/>
+              <a:t>stack </a:t>
+            </a:r>
+          </a:p>
+          <a:p>
+            <a:pPr lvl="3"/>
+            <a:r>
+              <a:rPr lang="en-US" dirty="0"/>
+              <a:t>-.states</a:t>
+            </a:r>
+          </a:p>
+          <a:p>
+            <a:pPr lvl="3"/>
+            <a:r>
+              <a:rPr lang="en-US" dirty="0"/>
+              <a:t>Prime</a:t>
+            </a:r>
+          </a:p>
+          <a:p>
+            <a:pPr lvl="3"/>
+            <a:r>
+              <a:rPr lang="en-US" dirty="0"/>
+              <a:t>exogenous</a:t>
             </a:r>
           </a:p>
           <a:p>
@@ -3968,13 +4044,6 @@
             <a:r>
               <a:rPr lang="en-US" dirty="0"/>
               <a:t>basis --- .controls</a:t>
-            </a:r>
-          </a:p>
-          <a:p>
-            <a:pPr lvl="2"/>
-            <a:r>
-              <a:rPr lang="en-US" dirty="0"/>
-              <a:t>coefficients ---  .controls</a:t>
             </a:r>
           </a:p>
           <a:p>
@@ -4003,13 +4072,6 @@
             </a:r>
           </a:p>
           <a:p>
-            <a:pPr lvl="2"/>
-            <a:r>
-              <a:rPr lang="en-US" dirty="0"/>
-              <a:t>coefficients</a:t>
-            </a:r>
-          </a:p>
-          <a:p>
             <a:pPr lvl="1"/>
             <a:r>
               <a:rPr lang="en-US" dirty="0"/>
@@ -4042,13 +4104,6 @@
             <a:r>
               <a:rPr lang="en-US" dirty="0"/>
               <a:t>endogenous</a:t>
-            </a:r>
-          </a:p>
-          <a:p>
-            <a:pPr lvl="3"/>
-            <a:r>
-              <a:rPr lang="en-US" dirty="0"/>
-              <a:t>states</a:t>
             </a:r>
           </a:p>
           <a:p>

</xml_diff>